<commit_message>
more updating graphs for figure 2
</commit_message>
<xml_diff>
--- a/figures/figure2/figure2.pptx
+++ b/figures/figure2/figure2.pptx
@@ -104,6 +104,11 @@
       </a:defRPr>
     </a:lvl9pPr>
   </p:defaultTextStyle>
+  <p:extLst>
+    <p:ext uri="{EFAFB233-063F-42B5-8137-9DF3F51BA10A}">
+      <p15:sldGuideLst xmlns:p15="http://schemas.microsoft.com/office/powerpoint/2012/main"/>
+    </p:ext>
+  </p:extLst>
 </p:presentation>
 </file>
 
@@ -238,7 +243,7 @@
           <a:p>
             <a:fld id="{36D6B43A-FB72-2B4A-8DB0-B6C23179BADB}" type="datetimeFigureOut">
               <a:rPr lang="en-US" smtClean="0"/>
-              <a:t>2/19/22</a:t>
+              <a:t>3/22/22</a:t>
             </a:fld>
             <a:endParaRPr lang="en-US"/>
           </a:p>
@@ -408,7 +413,7 @@
           <a:p>
             <a:fld id="{36D6B43A-FB72-2B4A-8DB0-B6C23179BADB}" type="datetimeFigureOut">
               <a:rPr lang="en-US" smtClean="0"/>
-              <a:t>2/19/22</a:t>
+              <a:t>3/22/22</a:t>
             </a:fld>
             <a:endParaRPr lang="en-US"/>
           </a:p>
@@ -588,7 +593,7 @@
           <a:p>
             <a:fld id="{36D6B43A-FB72-2B4A-8DB0-B6C23179BADB}" type="datetimeFigureOut">
               <a:rPr lang="en-US" smtClean="0"/>
-              <a:t>2/19/22</a:t>
+              <a:t>3/22/22</a:t>
             </a:fld>
             <a:endParaRPr lang="en-US"/>
           </a:p>
@@ -758,7 +763,7 @@
           <a:p>
             <a:fld id="{36D6B43A-FB72-2B4A-8DB0-B6C23179BADB}" type="datetimeFigureOut">
               <a:rPr lang="en-US" smtClean="0"/>
-              <a:t>2/19/22</a:t>
+              <a:t>3/22/22</a:t>
             </a:fld>
             <a:endParaRPr lang="en-US"/>
           </a:p>
@@ -1002,7 +1007,7 @@
           <a:p>
             <a:fld id="{36D6B43A-FB72-2B4A-8DB0-B6C23179BADB}" type="datetimeFigureOut">
               <a:rPr lang="en-US" smtClean="0"/>
-              <a:t>2/19/22</a:t>
+              <a:t>3/22/22</a:t>
             </a:fld>
             <a:endParaRPr lang="en-US"/>
           </a:p>
@@ -1234,7 +1239,7 @@
           <a:p>
             <a:fld id="{36D6B43A-FB72-2B4A-8DB0-B6C23179BADB}" type="datetimeFigureOut">
               <a:rPr lang="en-US" smtClean="0"/>
-              <a:t>2/19/22</a:t>
+              <a:t>3/22/22</a:t>
             </a:fld>
             <a:endParaRPr lang="en-US"/>
           </a:p>
@@ -1601,7 +1606,7 @@
           <a:p>
             <a:fld id="{36D6B43A-FB72-2B4A-8DB0-B6C23179BADB}" type="datetimeFigureOut">
               <a:rPr lang="en-US" smtClean="0"/>
-              <a:t>2/19/22</a:t>
+              <a:t>3/22/22</a:t>
             </a:fld>
             <a:endParaRPr lang="en-US"/>
           </a:p>
@@ -1719,7 +1724,7 @@
           <a:p>
             <a:fld id="{36D6B43A-FB72-2B4A-8DB0-B6C23179BADB}" type="datetimeFigureOut">
               <a:rPr lang="en-US" smtClean="0"/>
-              <a:t>2/19/22</a:t>
+              <a:t>3/22/22</a:t>
             </a:fld>
             <a:endParaRPr lang="en-US"/>
           </a:p>
@@ -1814,7 +1819,7 @@
           <a:p>
             <a:fld id="{36D6B43A-FB72-2B4A-8DB0-B6C23179BADB}" type="datetimeFigureOut">
               <a:rPr lang="en-US" smtClean="0"/>
-              <a:t>2/19/22</a:t>
+              <a:t>3/22/22</a:t>
             </a:fld>
             <a:endParaRPr lang="en-US"/>
           </a:p>
@@ -2091,7 +2096,7 @@
           <a:p>
             <a:fld id="{36D6B43A-FB72-2B4A-8DB0-B6C23179BADB}" type="datetimeFigureOut">
               <a:rPr lang="en-US" smtClean="0"/>
-              <a:t>2/19/22</a:t>
+              <a:t>3/22/22</a:t>
             </a:fld>
             <a:endParaRPr lang="en-US"/>
           </a:p>
@@ -2348,7 +2353,7 @@
           <a:p>
             <a:fld id="{36D6B43A-FB72-2B4A-8DB0-B6C23179BADB}" type="datetimeFigureOut">
               <a:rPr lang="en-US" smtClean="0"/>
-              <a:t>2/19/22</a:t>
+              <a:t>3/22/22</a:t>
             </a:fld>
             <a:endParaRPr lang="en-US"/>
           </a:p>
@@ -2561,7 +2566,7 @@
           <a:p>
             <a:fld id="{36D6B43A-FB72-2B4A-8DB0-B6C23179BADB}" type="datetimeFigureOut">
               <a:rPr lang="en-US" smtClean="0"/>
-              <a:t>2/19/22</a:t>
+              <a:t>3/22/22</a:t>
             </a:fld>
             <a:endParaRPr lang="en-US"/>
           </a:p>
@@ -2968,108 +2973,6 @@
       </p:grpSpPr>
       <p:pic>
         <p:nvPicPr>
-          <p:cNvPr id="15" name="Graphic 14">
-            <a:extLst>
-              <a:ext uri="{FF2B5EF4-FFF2-40B4-BE49-F238E27FC236}">
-                <a16:creationId xmlns:a16="http://schemas.microsoft.com/office/drawing/2014/main" id="{A69B506B-699C-4842-B7CB-4ACEFDFBE1A4}"/>
-              </a:ext>
-            </a:extLst>
-          </p:cNvPr>
-          <p:cNvPicPr>
-            <a:picLocks noChangeAspect="1"/>
-          </p:cNvPicPr>
-          <p:nvPr/>
-        </p:nvPicPr>
-        <p:blipFill>
-          <a:blip r:embed="rId2">
-            <a:extLst>
-              <a:ext uri="{96DAC541-7B7A-43D3-8B79-37D633B846F1}">
-                <asvg:svgBlip xmlns:asvg="http://schemas.microsoft.com/office/drawing/2016/SVG/main" r:embed="rId3"/>
-              </a:ext>
-            </a:extLst>
-          </a:blip>
-          <a:stretch>
-            <a:fillRect/>
-          </a:stretch>
-        </p:blipFill>
-        <p:spPr>
-          <a:xfrm>
-            <a:off x="4480560" y="3137134"/>
-            <a:ext cx="3840480" cy="2743200"/>
-          </a:xfrm>
-          <a:prstGeom prst="rect">
-            <a:avLst/>
-          </a:prstGeom>
-        </p:spPr>
-      </p:pic>
-      <p:pic>
-        <p:nvPicPr>
-          <p:cNvPr id="17" name="Picture 16">
-            <a:extLst>
-              <a:ext uri="{FF2B5EF4-FFF2-40B4-BE49-F238E27FC236}">
-                <a16:creationId xmlns:a16="http://schemas.microsoft.com/office/drawing/2014/main" id="{8AC39F1E-E7F8-C24D-B91A-29A04BD2AB9B}"/>
-              </a:ext>
-            </a:extLst>
-          </p:cNvPr>
-          <p:cNvPicPr>
-            <a:picLocks noChangeAspect="1"/>
-          </p:cNvPicPr>
-          <p:nvPr/>
-        </p:nvPicPr>
-        <p:blipFill>
-          <a:blip r:embed="rId4"/>
-          <a:stretch>
-            <a:fillRect/>
-          </a:stretch>
-        </p:blipFill>
-        <p:spPr>
-          <a:xfrm>
-            <a:off x="-4849796" y="3233193"/>
-            <a:ext cx="8954436" cy="6396026"/>
-          </a:xfrm>
-          <a:prstGeom prst="rect">
-            <a:avLst/>
-          </a:prstGeom>
-        </p:spPr>
-      </p:pic>
-      <p:pic>
-        <p:nvPicPr>
-          <p:cNvPr id="19" name="Graphic 18">
-            <a:extLst>
-              <a:ext uri="{FF2B5EF4-FFF2-40B4-BE49-F238E27FC236}">
-                <a16:creationId xmlns:a16="http://schemas.microsoft.com/office/drawing/2014/main" id="{89CAE0A6-66C4-384D-9A4E-368E31DE38E6}"/>
-              </a:ext>
-            </a:extLst>
-          </p:cNvPr>
-          <p:cNvPicPr>
-            <a:picLocks noChangeAspect="1"/>
-          </p:cNvPicPr>
-          <p:nvPr/>
-        </p:nvPicPr>
-        <p:blipFill>
-          <a:blip r:embed="rId5">
-            <a:extLst>
-              <a:ext uri="{96DAC541-7B7A-43D3-8B79-37D633B846F1}">
-                <asvg:svgBlip xmlns:asvg="http://schemas.microsoft.com/office/drawing/2016/SVG/main" r:embed="rId6"/>
-              </a:ext>
-            </a:extLst>
-          </a:blip>
-          <a:stretch>
-            <a:fillRect/>
-          </a:stretch>
-        </p:blipFill>
-        <p:spPr>
-          <a:xfrm>
-            <a:off x="-4034" y="7985760"/>
-            <a:ext cx="5261309" cy="3758078"/>
-          </a:xfrm>
-          <a:prstGeom prst="rect">
-            <a:avLst/>
-          </a:prstGeom>
-        </p:spPr>
-      </p:pic>
-      <p:pic>
-        <p:nvPicPr>
           <p:cNvPr id="20" name="Picture 19">
             <a:extLst>
               <a:ext uri="{FF2B5EF4-FFF2-40B4-BE49-F238E27FC236}">
@@ -3083,14 +2986,14 @@
           <p:nvPr/>
         </p:nvPicPr>
         <p:blipFill>
-          <a:blip r:embed="rId7"/>
+          <a:blip r:embed="rId2"/>
           <a:stretch>
             <a:fillRect/>
           </a:stretch>
         </p:blipFill>
         <p:spPr>
           <a:xfrm>
-            <a:off x="1211207" y="1967012"/>
+            <a:off x="-3263516" y="2103199"/>
             <a:ext cx="1517799" cy="709406"/>
           </a:xfrm>
           <a:prstGeom prst="rect">
@@ -3112,7 +3015,7 @@
         </p:nvGrpSpPr>
         <p:grpSpPr>
           <a:xfrm>
-            <a:off x="105510" y="663627"/>
+            <a:off x="-4369213" y="799814"/>
             <a:ext cx="3094087" cy="1082355"/>
             <a:chOff x="533400" y="100568"/>
             <a:chExt cx="3094087" cy="1082355"/>
@@ -3493,7 +3396,7 @@
         </p:nvSpPr>
         <p:spPr>
           <a:xfrm>
-            <a:off x="1052610" y="137471"/>
+            <a:off x="-3422113" y="273658"/>
             <a:ext cx="1126142" cy="369332"/>
           </a:xfrm>
           <a:prstGeom prst="rect">
@@ -3514,41 +3417,72 @@
           </a:p>
         </p:txBody>
       </p:sp>
-      <p:sp>
-        <p:nvSpPr>
-          <p:cNvPr id="33" name="TextBox 32">
+      <p:pic>
+        <p:nvPicPr>
+          <p:cNvPr id="7" name="Picture 6">
             <a:extLst>
               <a:ext uri="{FF2B5EF4-FFF2-40B4-BE49-F238E27FC236}">
-                <a16:creationId xmlns:a16="http://schemas.microsoft.com/office/drawing/2014/main" id="{B0EFD692-7320-3E43-8F22-C40F5EB6B271}"/>
+                <a16:creationId xmlns:a16="http://schemas.microsoft.com/office/drawing/2014/main" id="{D707A1D4-4704-DC40-907D-8201EF027B3E}"/>
               </a:ext>
             </a:extLst>
           </p:cNvPr>
-          <p:cNvSpPr txBox="1"/>
+          <p:cNvPicPr>
+            <a:picLocks noChangeAspect="1"/>
+          </p:cNvPicPr>
           <p:nvPr/>
-        </p:nvSpPr>
+        </p:nvPicPr>
+        <p:blipFill>
+          <a:blip r:embed="rId3"/>
+          <a:stretch>
+            <a:fillRect/>
+          </a:stretch>
+        </p:blipFill>
         <p:spPr>
           <a:xfrm>
-            <a:off x="4480560" y="137471"/>
-            <a:ext cx="1122615" cy="369332"/>
+            <a:off x="0" y="1"/>
+            <a:ext cx="2958678" cy="2451370"/>
           </a:xfrm>
           <a:prstGeom prst="rect">
             <a:avLst/>
           </a:prstGeom>
-          <a:noFill/>
         </p:spPr>
-        <p:txBody>
-          <a:bodyPr wrap="none" rtlCol="0">
-            <a:spAutoFit/>
-          </a:bodyPr>
-          <a:lstStyle/>
-          <a:p>
-            <a:r>
-              <a:rPr lang="en-US" dirty="0"/>
-              <a:t>Input tree</a:t>
-            </a:r>
-          </a:p>
-        </p:txBody>
-      </p:sp>
+      </p:pic>
+      <p:pic>
+        <p:nvPicPr>
+          <p:cNvPr id="44" name="Graphic 43">
+            <a:extLst>
+              <a:ext uri="{FF2B5EF4-FFF2-40B4-BE49-F238E27FC236}">
+                <a16:creationId xmlns:a16="http://schemas.microsoft.com/office/drawing/2014/main" id="{D696CAB4-408A-EC4D-9BCE-4050684684BE}"/>
+              </a:ext>
+            </a:extLst>
+          </p:cNvPr>
+          <p:cNvPicPr>
+            <a:picLocks noChangeAspect="1"/>
+          </p:cNvPicPr>
+          <p:nvPr/>
+        </p:nvPicPr>
+        <p:blipFill>
+          <a:blip r:embed="rId4">
+            <a:extLst>
+              <a:ext uri="{96DAC541-7B7A-43D3-8B79-37D633B846F1}">
+                <asvg:svgBlip xmlns:asvg="http://schemas.microsoft.com/office/drawing/2016/SVG/main" r:embed="rId5"/>
+              </a:ext>
+            </a:extLst>
+          </a:blip>
+          <a:stretch>
+            <a:fillRect/>
+          </a:stretch>
+        </p:blipFill>
+        <p:spPr>
+          <a:xfrm>
+            <a:off x="0" y="2679402"/>
+            <a:ext cx="6400800" cy="6400800"/>
+          </a:xfrm>
+          <a:prstGeom prst="rect">
+            <a:avLst/>
+          </a:prstGeom>
+        </p:spPr>
+      </p:pic>
     </p:spTree>
     <p:extLst>
       <p:ext uri="{BB962C8B-B14F-4D97-AF65-F5344CB8AC3E}">

</xml_diff>

<commit_message>
choosing the right colors
</commit_message>
<xml_diff>
--- a/figures/figure2/figure2.pptx
+++ b/figures/figure2/figure2.pptx
@@ -3449,10 +3449,10 @@
       </p:pic>
       <p:pic>
         <p:nvPicPr>
-          <p:cNvPr id="44" name="Graphic 43">
+          <p:cNvPr id="62" name="Graphic 61">
             <a:extLst>
               <a:ext uri="{FF2B5EF4-FFF2-40B4-BE49-F238E27FC236}">
-                <a16:creationId xmlns:a16="http://schemas.microsoft.com/office/drawing/2014/main" id="{D696CAB4-408A-EC4D-9BCE-4050684684BE}"/>
+                <a16:creationId xmlns:a16="http://schemas.microsoft.com/office/drawing/2014/main" id="{1E396271-02AF-874A-8B12-AA3D173388CD}"/>
               </a:ext>
             </a:extLst>
           </p:cNvPr>
@@ -3475,8 +3475,44 @@
         </p:blipFill>
         <p:spPr>
           <a:xfrm>
-            <a:off x="0" y="2679402"/>
-            <a:ext cx="6400800" cy="6400800"/>
+            <a:off x="3088411" y="89019"/>
+            <a:ext cx="3237958" cy="2698298"/>
+          </a:xfrm>
+          <a:prstGeom prst="rect">
+            <a:avLst/>
+          </a:prstGeom>
+        </p:spPr>
+      </p:pic>
+      <p:pic>
+        <p:nvPicPr>
+          <p:cNvPr id="66" name="Graphic 65">
+            <a:extLst>
+              <a:ext uri="{FF2B5EF4-FFF2-40B4-BE49-F238E27FC236}">
+                <a16:creationId xmlns:a16="http://schemas.microsoft.com/office/drawing/2014/main" id="{EB22CD8F-BEAC-CC4E-94E7-16F3E8F4F307}"/>
+              </a:ext>
+            </a:extLst>
+          </p:cNvPr>
+          <p:cNvPicPr>
+            <a:picLocks noChangeAspect="1"/>
+          </p:cNvPicPr>
+          <p:nvPr/>
+        </p:nvPicPr>
+        <p:blipFill>
+          <a:blip r:embed="rId6">
+            <a:extLst>
+              <a:ext uri="{96DAC541-7B7A-43D3-8B79-37D633B846F1}">
+                <asvg:svgBlip xmlns:asvg="http://schemas.microsoft.com/office/drawing/2016/SVG/main" r:embed="rId7"/>
+              </a:ext>
+            </a:extLst>
+          </a:blip>
+          <a:stretch>
+            <a:fillRect/>
+          </a:stretch>
+        </p:blipFill>
+        <p:spPr>
+          <a:xfrm>
+            <a:off x="0" y="3810000"/>
+            <a:ext cx="6400800" cy="5181600"/>
           </a:xfrm>
           <a:prstGeom prst="rect">
             <a:avLst/>

</xml_diff>